<commit_message>
World of Technology Course Updates
</commit_message>
<xml_diff>
--- a/Templates/Powerpoint/Template - Powerpoint Assets.pptx
+++ b/Templates/Powerpoint/Template - Powerpoint Assets.pptx
@@ -5,22 +5,25 @@
     <p:sldMasterId id="2147483648" r:id="rId1"/>
   </p:sldMasterIdLst>
   <p:notesMasterIdLst>
-    <p:notesMasterId r:id="rId12"/>
+    <p:notesMasterId r:id="rId15"/>
   </p:notesMasterIdLst>
   <p:handoutMasterIdLst>
-    <p:handoutMasterId r:id="rId13"/>
+    <p:handoutMasterId r:id="rId16"/>
   </p:handoutMasterIdLst>
   <p:sldIdLst>
     <p:sldId id="268" r:id="rId2"/>
     <p:sldId id="269" r:id="rId3"/>
-    <p:sldId id="270" r:id="rId4"/>
-    <p:sldId id="271" r:id="rId5"/>
-    <p:sldId id="272" r:id="rId6"/>
-    <p:sldId id="273" r:id="rId7"/>
-    <p:sldId id="274" r:id="rId8"/>
-    <p:sldId id="275" r:id="rId9"/>
-    <p:sldId id="277" r:id="rId10"/>
-    <p:sldId id="278" r:id="rId11"/>
+    <p:sldId id="279" r:id="rId4"/>
+    <p:sldId id="280" r:id="rId5"/>
+    <p:sldId id="281" r:id="rId6"/>
+    <p:sldId id="270" r:id="rId7"/>
+    <p:sldId id="271" r:id="rId8"/>
+    <p:sldId id="272" r:id="rId9"/>
+    <p:sldId id="273" r:id="rId10"/>
+    <p:sldId id="274" r:id="rId11"/>
+    <p:sldId id="275" r:id="rId12"/>
+    <p:sldId id="277" r:id="rId13"/>
+    <p:sldId id="278" r:id="rId14"/>
   </p:sldIdLst>
   <p:sldSz cx="12192000" cy="6858000"/>
   <p:notesSz cx="6858000" cy="9144000"/>
@@ -139,10 +142,6 @@
     </p:ext>
   </p:extLst>
 </p:presentation>
-</file>
-
-<file path=ppt/revisionInfo.xml><?xml version="1.0" encoding="utf-8"?>
-<p1510:revInfo xmlns:a="http://schemas.openxmlformats.org/drawingml/2006/main" xmlns:r="http://schemas.openxmlformats.org/officeDocument/2006/relationships" xmlns:p1510="http://schemas.microsoft.com/office/powerpoint/2015/10/main"/>
 </file>
 
 <file path=ppt/charts/chart1.xml><?xml version="1.0" encoding="utf-8"?>
@@ -6012,7 +6011,7 @@
           <a:p>
             <a:fld id="{6AC4FB8F-ED15-48AB-97BD-17129D4E699D}" type="datetimeFigureOut">
               <a:rPr lang="en-US" smtClean="0"/>
-              <a:t>1/26/2018</a:t>
+              <a:t>5/3/2018</a:t>
             </a:fld>
             <a:endParaRPr lang="en-US" dirty="0"/>
           </a:p>
@@ -6177,7 +6176,7 @@
           <a:p>
             <a:fld id="{BBC9D437-CD83-4825-AD0D-5E7B341BC79B}" type="datetimeFigureOut">
               <a:rPr lang="en-US" smtClean="0"/>
-              <a:t>1/26/2018</a:t>
+              <a:t>5/3/2018</a:t>
             </a:fld>
             <a:endParaRPr lang="en-US" dirty="0"/>
           </a:p>
@@ -6603,7 +6602,7 @@
           <a:p>
             <a:fld id="{DD2465DD-9819-4ABC-A784-477AFBA19C86}" type="datetime1">
               <a:rPr lang="en-US" smtClean="0"/>
-              <a:t>1/26/2018</a:t>
+              <a:t>5/3/2018</a:t>
             </a:fld>
             <a:endParaRPr lang="en-US" dirty="0"/>
           </a:p>
@@ -6788,7 +6787,7 @@
           <a:p>
             <a:fld id="{0161E545-DA4D-4588-A168-A47EEF327FC2}" type="datetime1">
               <a:rPr lang="en-US" smtClean="0"/>
-              <a:t>1/26/2018</a:t>
+              <a:t>5/3/2018</a:t>
             </a:fld>
             <a:endParaRPr lang="en-US" dirty="0"/>
           </a:p>
@@ -6986,7 +6985,7 @@
           <a:p>
             <a:fld id="{8FB26042-7092-4D96-B3CE-E8E6CFEE88C8}" type="datetime1">
               <a:rPr lang="en-US" smtClean="0"/>
-              <a:t>1/26/2018</a:t>
+              <a:t>5/3/2018</a:t>
             </a:fld>
             <a:endParaRPr lang="en-US" dirty="0"/>
           </a:p>
@@ -7180,7 +7179,7 @@
           <a:p>
             <a:fld id="{9729644A-97F2-4BC4-BBF7-FC141F507563}" type="datetime1">
               <a:rPr lang="en-US" smtClean="0"/>
-              <a:t>1/26/2018</a:t>
+              <a:t>5/3/2018</a:t>
             </a:fld>
             <a:endParaRPr lang="en-US" dirty="0"/>
           </a:p>
@@ -7669,7 +7668,7 @@
           <a:p>
             <a:fld id="{72104EB7-77EC-481E-BDC6-73CA182AC952}" type="datetime1">
               <a:rPr lang="en-US" smtClean="0"/>
-              <a:t>1/26/2018</a:t>
+              <a:t>5/3/2018</a:t>
             </a:fld>
             <a:endParaRPr lang="en-US" dirty="0"/>
           </a:p>
@@ -8107,7 +8106,7 @@
           <a:p>
             <a:fld id="{A0016069-A392-4E44-934F-6743D63E2A4F}" type="datetime1">
               <a:rPr lang="en-US" smtClean="0"/>
-              <a:t>1/26/2018</a:t>
+              <a:t>5/3/2018</a:t>
             </a:fld>
             <a:endParaRPr lang="en-US" dirty="0"/>
           </a:p>
@@ -8240,7 +8239,7 @@
           <a:p>
             <a:fld id="{781F9843-3551-47D6-BD3E-346FBDF458AF}" type="datetime1">
               <a:rPr lang="en-US" smtClean="0"/>
-              <a:t>1/26/2018</a:t>
+              <a:t>5/3/2018</a:t>
             </a:fld>
             <a:endParaRPr lang="en-US" dirty="0"/>
           </a:p>
@@ -8350,7 +8349,7 @@
           <a:p>
             <a:fld id="{B68C2989-19D5-42F7-8321-FE6B75231AF4}" type="datetime1">
               <a:rPr lang="en-US" smtClean="0"/>
-              <a:t>1/26/2018</a:t>
+              <a:t>5/3/2018</a:t>
             </a:fld>
             <a:endParaRPr lang="en-US" dirty="0"/>
           </a:p>
@@ -8664,7 +8663,7 @@
           <a:p>
             <a:fld id="{20F9C03C-1F27-412D-AD0B-6423348F1B9B}" type="datetime1">
               <a:rPr lang="en-US" smtClean="0"/>
-              <a:t>1/26/2018</a:t>
+              <a:t>5/3/2018</a:t>
             </a:fld>
             <a:endParaRPr lang="en-US" dirty="0"/>
           </a:p>
@@ -9181,7 +9180,7 @@
           <a:p>
             <a:fld id="{619CFDC2-5630-4611-9BF0-0EF7C8C4398D}" type="datetime1">
               <a:rPr lang="en-US" smtClean="0"/>
-              <a:t>1/26/2018</a:t>
+              <a:t>5/3/2018</a:t>
             </a:fld>
             <a:endParaRPr lang="en-US" dirty="0"/>
           </a:p>
@@ -9649,7 +9648,7 @@
           <a:p>
             <a:r>
               <a:rPr lang="en-US" dirty="0"/>
-              <a:t>Title layout</a:t>
+              <a:t>World of Technology</a:t>
             </a:r>
           </a:p>
         </p:txBody>
@@ -9671,7 +9670,7 @@
           <a:p>
             <a:r>
               <a:rPr lang="en-US" dirty="0"/>
-              <a:t>Subtitle</a:t>
+              <a:t>Unit 0 – Section 1 – Day 1</a:t>
             </a:r>
           </a:p>
         </p:txBody>
@@ -9735,6 +9734,312 @@
           <a:p>
             <a:r>
               <a:rPr lang="en-US" dirty="0"/>
+              <a:t>Add a Slide Title - 2</a:t>
+            </a:r>
+          </a:p>
+        </p:txBody>
+      </p:sp>
+      <p:sp>
+        <p:nvSpPr>
+          <p:cNvPr id="3" name="Text Placeholder 2"/>
+          <p:cNvSpPr>
+            <a:spLocks noGrp="1"/>
+          </p:cNvSpPr>
+          <p:nvPr>
+            <p:ph type="body" idx="1"/>
+          </p:nvPr>
+        </p:nvSpPr>
+        <p:spPr/>
+        <p:txBody>
+          <a:bodyPr/>
+          <a:lstStyle/>
+          <a:p>
+            <a:endParaRPr lang="en-US" dirty="0"/>
+          </a:p>
+        </p:txBody>
+      </p:sp>
+      <p:sp>
+        <p:nvSpPr>
+          <p:cNvPr id="4" name="Content Placeholder 3"/>
+          <p:cNvSpPr>
+            <a:spLocks noGrp="1"/>
+          </p:cNvSpPr>
+          <p:nvPr>
+            <p:ph sz="half" idx="2"/>
+          </p:nvPr>
+        </p:nvSpPr>
+        <p:spPr/>
+        <p:txBody>
+          <a:bodyPr/>
+          <a:lstStyle/>
+          <a:p>
+            <a:endParaRPr lang="en-US" dirty="0"/>
+          </a:p>
+        </p:txBody>
+      </p:sp>
+      <p:sp>
+        <p:nvSpPr>
+          <p:cNvPr id="5" name="Text Placeholder 4"/>
+          <p:cNvSpPr>
+            <a:spLocks noGrp="1"/>
+          </p:cNvSpPr>
+          <p:nvPr>
+            <p:ph type="body" sz="quarter" idx="3"/>
+          </p:nvPr>
+        </p:nvSpPr>
+        <p:spPr/>
+        <p:txBody>
+          <a:bodyPr/>
+          <a:lstStyle/>
+          <a:p>
+            <a:endParaRPr lang="en-US" dirty="0"/>
+          </a:p>
+        </p:txBody>
+      </p:sp>
+      <p:sp>
+        <p:nvSpPr>
+          <p:cNvPr id="6" name="Content Placeholder 5"/>
+          <p:cNvSpPr>
+            <a:spLocks noGrp="1"/>
+          </p:cNvSpPr>
+          <p:nvPr>
+            <p:ph sz="quarter" idx="4"/>
+          </p:nvPr>
+        </p:nvSpPr>
+        <p:spPr/>
+        <p:txBody>
+          <a:bodyPr/>
+          <a:lstStyle/>
+          <a:p>
+            <a:endParaRPr lang="en-US" dirty="0"/>
+          </a:p>
+        </p:txBody>
+      </p:sp>
+    </p:spTree>
+    <p:extLst>
+      <p:ext uri="{BB962C8B-B14F-4D97-AF65-F5344CB8AC3E}">
+        <p14:creationId xmlns:p14="http://schemas.microsoft.com/office/powerpoint/2010/main" val="1397893279"/>
+      </p:ext>
+    </p:extLst>
+  </p:cSld>
+  <p:clrMapOvr>
+    <a:masterClrMapping/>
+  </p:clrMapOvr>
+  <mc:AlternateContent xmlns:mc="http://schemas.openxmlformats.org/markup-compatibility/2006" xmlns:p14="http://schemas.microsoft.com/office/powerpoint/2010/main">
+    <mc:Choice Requires="p14">
+      <p:transition spd="med" p14:dur="700">
+        <p:fade/>
+      </p:transition>
+    </mc:Choice>
+    <mc:Fallback xmlns="">
+      <p:transition spd="med">
+        <p:fade/>
+      </p:transition>
+    </mc:Fallback>
+  </mc:AlternateContent>
+</p:sld>
+</file>
+
+<file path=ppt/slides/slide11.xml><?xml version="1.0" encoding="utf-8"?>
+<p:sld xmlns:a="http://schemas.openxmlformats.org/drawingml/2006/main" xmlns:r="http://schemas.openxmlformats.org/officeDocument/2006/relationships" xmlns:p="http://schemas.openxmlformats.org/presentationml/2006/main">
+  <p:cSld>
+    <p:spTree>
+      <p:nvGrpSpPr>
+        <p:cNvPr id="1" name=""/>
+        <p:cNvGrpSpPr/>
+        <p:nvPr/>
+      </p:nvGrpSpPr>
+      <p:grpSpPr>
+        <a:xfrm>
+          <a:off x="0" y="0"/>
+          <a:ext cx="0" cy="0"/>
+          <a:chOff x="0" y="0"/>
+          <a:chExt cx="0" cy="0"/>
+        </a:xfrm>
+      </p:grpSpPr>
+      <p:sp>
+        <p:nvSpPr>
+          <p:cNvPr id="2" name="Title 1"/>
+          <p:cNvSpPr>
+            <a:spLocks noGrp="1"/>
+          </p:cNvSpPr>
+          <p:nvPr>
+            <p:ph type="title"/>
+          </p:nvPr>
+        </p:nvSpPr>
+        <p:spPr/>
+        <p:txBody>
+          <a:bodyPr/>
+          <a:lstStyle/>
+          <a:p>
+            <a:r>
+              <a:rPr lang="en-US" dirty="0"/>
+              <a:t>Add a Slide Title - 3</a:t>
+            </a:r>
+          </a:p>
+        </p:txBody>
+      </p:sp>
+    </p:spTree>
+    <p:extLst>
+      <p:ext uri="{BB962C8B-B14F-4D97-AF65-F5344CB8AC3E}">
+        <p14:creationId xmlns:p14="http://schemas.microsoft.com/office/powerpoint/2010/main" val="2132301138"/>
+      </p:ext>
+    </p:extLst>
+  </p:cSld>
+  <p:clrMapOvr>
+    <a:masterClrMapping/>
+  </p:clrMapOvr>
+  <mc:AlternateContent xmlns:mc="http://schemas.openxmlformats.org/markup-compatibility/2006" xmlns:p14="http://schemas.microsoft.com/office/powerpoint/2010/main">
+    <mc:Choice Requires="p14">
+      <p:transition spd="med" p14:dur="700">
+        <p:fade/>
+      </p:transition>
+    </mc:Choice>
+    <mc:Fallback xmlns="">
+      <p:transition spd="med">
+        <p:fade/>
+      </p:transition>
+    </mc:Fallback>
+  </mc:AlternateContent>
+</p:sld>
+</file>
+
+<file path=ppt/slides/slide12.xml><?xml version="1.0" encoding="utf-8"?>
+<p:sld xmlns:a="http://schemas.openxmlformats.org/drawingml/2006/main" xmlns:r="http://schemas.openxmlformats.org/officeDocument/2006/relationships" xmlns:p="http://schemas.openxmlformats.org/presentationml/2006/main">
+  <p:cSld>
+    <p:spTree>
+      <p:nvGrpSpPr>
+        <p:cNvPr id="1" name=""/>
+        <p:cNvGrpSpPr/>
+        <p:nvPr/>
+      </p:nvGrpSpPr>
+      <p:grpSpPr>
+        <a:xfrm>
+          <a:off x="0" y="0"/>
+          <a:ext cx="0" cy="0"/>
+          <a:chOff x="0" y="0"/>
+          <a:chExt cx="0" cy="0"/>
+        </a:xfrm>
+      </p:grpSpPr>
+      <p:sp>
+        <p:nvSpPr>
+          <p:cNvPr id="2" name="Title 1"/>
+          <p:cNvSpPr>
+            <a:spLocks noGrp="1"/>
+          </p:cNvSpPr>
+          <p:nvPr>
+            <p:ph type="title"/>
+          </p:nvPr>
+        </p:nvSpPr>
+        <p:spPr/>
+        <p:txBody>
+          <a:bodyPr/>
+          <a:lstStyle/>
+          <a:p>
+            <a:r>
+              <a:rPr lang="en-US" dirty="0"/>
+              <a:t>Add a Slide Title - 4</a:t>
+            </a:r>
+          </a:p>
+        </p:txBody>
+      </p:sp>
+      <p:sp>
+        <p:nvSpPr>
+          <p:cNvPr id="3" name="Content Placeholder 2"/>
+          <p:cNvSpPr>
+            <a:spLocks noGrp="1"/>
+          </p:cNvSpPr>
+          <p:nvPr>
+            <p:ph idx="1"/>
+          </p:nvPr>
+        </p:nvSpPr>
+        <p:spPr/>
+        <p:txBody>
+          <a:bodyPr/>
+          <a:lstStyle/>
+          <a:p>
+            <a:endParaRPr lang="en-US" dirty="0"/>
+          </a:p>
+        </p:txBody>
+      </p:sp>
+      <p:sp>
+        <p:nvSpPr>
+          <p:cNvPr id="4" name="Text Placeholder 3"/>
+          <p:cNvSpPr>
+            <a:spLocks noGrp="1"/>
+          </p:cNvSpPr>
+          <p:nvPr>
+            <p:ph type="body" sz="half" idx="2"/>
+          </p:nvPr>
+        </p:nvSpPr>
+        <p:spPr/>
+        <p:txBody>
+          <a:bodyPr/>
+          <a:lstStyle/>
+          <a:p>
+            <a:endParaRPr lang="en-US" dirty="0"/>
+          </a:p>
+        </p:txBody>
+      </p:sp>
+    </p:spTree>
+    <p:extLst>
+      <p:ext uri="{BB962C8B-B14F-4D97-AF65-F5344CB8AC3E}">
+        <p14:creationId xmlns:p14="http://schemas.microsoft.com/office/powerpoint/2010/main" val="1718594860"/>
+      </p:ext>
+    </p:extLst>
+  </p:cSld>
+  <p:clrMapOvr>
+    <a:masterClrMapping/>
+  </p:clrMapOvr>
+  <mc:AlternateContent xmlns:mc="http://schemas.openxmlformats.org/markup-compatibility/2006" xmlns:p14="http://schemas.microsoft.com/office/powerpoint/2010/main">
+    <mc:Choice Requires="p14">
+      <p:transition spd="med" p14:dur="700">
+        <p:fade/>
+      </p:transition>
+    </mc:Choice>
+    <mc:Fallback xmlns="">
+      <p:transition spd="med">
+        <p:fade/>
+      </p:transition>
+    </mc:Fallback>
+  </mc:AlternateContent>
+</p:sld>
+</file>
+
+<file path=ppt/slides/slide13.xml><?xml version="1.0" encoding="utf-8"?>
+<p:sld xmlns:a="http://schemas.openxmlformats.org/drawingml/2006/main" xmlns:r="http://schemas.openxmlformats.org/officeDocument/2006/relationships" xmlns:p="http://schemas.openxmlformats.org/presentationml/2006/main">
+  <p:cSld>
+    <p:spTree>
+      <p:nvGrpSpPr>
+        <p:cNvPr id="1" name=""/>
+        <p:cNvGrpSpPr/>
+        <p:nvPr/>
+      </p:nvGrpSpPr>
+      <p:grpSpPr>
+        <a:xfrm>
+          <a:off x="0" y="0"/>
+          <a:ext cx="0" cy="0"/>
+          <a:chOff x="0" y="0"/>
+          <a:chExt cx="0" cy="0"/>
+        </a:xfrm>
+      </p:grpSpPr>
+      <p:sp>
+        <p:nvSpPr>
+          <p:cNvPr id="2" name="Title 1"/>
+          <p:cNvSpPr>
+            <a:spLocks noGrp="1"/>
+          </p:cNvSpPr>
+          <p:nvPr>
+            <p:ph type="title"/>
+          </p:nvPr>
+        </p:nvSpPr>
+        <p:spPr/>
+        <p:txBody>
+          <a:bodyPr/>
+          <a:lstStyle/>
+          <a:p>
+            <a:r>
+              <a:rPr lang="en-US" dirty="0"/>
               <a:t>Add a Slide Title - 5</a:t>
             </a:r>
           </a:p>
@@ -9830,7 +10135,7 @@
           <a:p>
             <a:r>
               <a:rPr lang="en-US" dirty="0"/>
-              <a:t>Title and content layout with list</a:t>
+              <a:t>The bid idea</a:t>
             </a:r>
           </a:p>
         </p:txBody>
@@ -9851,20 +10156,22 @@
           <a:lstStyle/>
           <a:p>
             <a:r>
-              <a:rPr lang="en-US" dirty="0"/>
-              <a:t>Add your first bullet point here</a:t>
+              <a:rPr lang="en-US" dirty="0">
+                <a:cs typeface="Arial" pitchFamily="34" charset="0"/>
+              </a:rPr>
+              <a:t>The 21</a:t>
             </a:r>
-          </a:p>
-          <a:p>
             <a:r>
-              <a:rPr lang="en-US" dirty="0"/>
-              <a:t>Add your second bullet point here</a:t>
+              <a:rPr lang="en-US" baseline="30000" dirty="0">
+                <a:cs typeface="Arial" pitchFamily="34" charset="0"/>
+              </a:rPr>
+              <a:t>st</a:t>
             </a:r>
-          </a:p>
-          <a:p>
             <a:r>
-              <a:rPr lang="en-US" dirty="0"/>
-              <a:t>Add your third bullet point here</a:t>
+              <a:rPr lang="en-US" dirty="0">
+                <a:cs typeface="Arial" pitchFamily="34" charset="0"/>
+              </a:rPr>
+              <a:t> century skills of collaboration and problem solving are essential for engineering solutions of the future.</a:t>
             </a:r>
           </a:p>
         </p:txBody>
@@ -9928,6 +10235,438 @@
           <a:p>
             <a:r>
               <a:rPr lang="en-US" dirty="0"/>
+              <a:t>The bid idea</a:t>
+            </a:r>
+          </a:p>
+        </p:txBody>
+      </p:sp>
+      <p:sp>
+        <p:nvSpPr>
+          <p:cNvPr id="3" name="Content Placeholder 2"/>
+          <p:cNvSpPr>
+            <a:spLocks noGrp="1"/>
+          </p:cNvSpPr>
+          <p:nvPr>
+            <p:ph idx="1"/>
+          </p:nvPr>
+        </p:nvSpPr>
+        <p:spPr/>
+        <p:txBody>
+          <a:bodyPr/>
+          <a:lstStyle/>
+          <a:p>
+            <a:pPr>
+              <a:spcBef>
+                <a:spcPts val="1200"/>
+              </a:spcBef>
+            </a:pPr>
+            <a:r>
+              <a:rPr lang="en-US" altLang="en-US" dirty="0">
+                <a:cs typeface="Arial" panose="020B0604020202020204" pitchFamily="34" charset="0"/>
+              </a:rPr>
+              <a:t>Design a self-propelled vehicle that will transport a passenger safely from point A to Point B.</a:t>
+            </a:r>
+          </a:p>
+          <a:p>
+            <a:pPr>
+              <a:spcBef>
+                <a:spcPts val="1200"/>
+              </a:spcBef>
+            </a:pPr>
+            <a:endParaRPr lang="en-US" altLang="en-US" sz="800" dirty="0">
+              <a:cs typeface="Arial" panose="020B0604020202020204" pitchFamily="34" charset="0"/>
+            </a:endParaRPr>
+          </a:p>
+          <a:p>
+            <a:pPr>
+              <a:spcBef>
+                <a:spcPts val="1200"/>
+              </a:spcBef>
+            </a:pPr>
+            <a:r>
+              <a:rPr lang="en-US" altLang="en-US" dirty="0">
+                <a:cs typeface="Arial" panose="020B0604020202020204" pitchFamily="34" charset="0"/>
+              </a:rPr>
+              <a:t>Restrictions: </a:t>
+            </a:r>
+          </a:p>
+          <a:p>
+            <a:pPr marL="781050" lvl="1" indent="-342900"/>
+            <a:r>
+              <a:rPr lang="en-US" altLang="en-US" dirty="0">
+                <a:cs typeface="Arial" panose="020B0604020202020204" pitchFamily="34" charset="0"/>
+              </a:rPr>
+              <a:t>You may only use the provided materials</a:t>
+            </a:r>
+          </a:p>
+          <a:p>
+            <a:pPr marL="781050" lvl="1" indent="-342900"/>
+            <a:r>
+              <a:rPr lang="en-US" altLang="en-US" dirty="0">
+                <a:cs typeface="Arial" panose="020B0604020202020204" pitchFamily="34" charset="0"/>
+              </a:rPr>
+              <a:t>You have one class period to complete the activity</a:t>
+            </a:r>
+          </a:p>
+        </p:txBody>
+      </p:sp>
+    </p:spTree>
+    <p:extLst>
+      <p:ext uri="{BB962C8B-B14F-4D97-AF65-F5344CB8AC3E}">
+        <p14:creationId xmlns:p14="http://schemas.microsoft.com/office/powerpoint/2010/main" val="3081625508"/>
+      </p:ext>
+    </p:extLst>
+  </p:cSld>
+  <p:clrMapOvr>
+    <a:masterClrMapping/>
+  </p:clrMapOvr>
+  <mc:AlternateContent xmlns:mc="http://schemas.openxmlformats.org/markup-compatibility/2006" xmlns:p14="http://schemas.microsoft.com/office/powerpoint/2010/main">
+    <mc:Choice Requires="p14">
+      <p:transition spd="med" p14:dur="700">
+        <p:fade/>
+      </p:transition>
+    </mc:Choice>
+    <mc:Fallback xmlns="">
+      <p:transition spd="med">
+        <p:fade/>
+      </p:transition>
+    </mc:Fallback>
+  </mc:AlternateContent>
+</p:sld>
+</file>
+
+<file path=ppt/slides/slide4.xml><?xml version="1.0" encoding="utf-8"?>
+<p:sld xmlns:a="http://schemas.openxmlformats.org/drawingml/2006/main" xmlns:r="http://schemas.openxmlformats.org/officeDocument/2006/relationships" xmlns:p="http://schemas.openxmlformats.org/presentationml/2006/main">
+  <p:cSld>
+    <p:spTree>
+      <p:nvGrpSpPr>
+        <p:cNvPr id="1" name=""/>
+        <p:cNvGrpSpPr/>
+        <p:nvPr/>
+      </p:nvGrpSpPr>
+      <p:grpSpPr>
+        <a:xfrm>
+          <a:off x="0" y="0"/>
+          <a:ext cx="0" cy="0"/>
+          <a:chOff x="0" y="0"/>
+          <a:chExt cx="0" cy="0"/>
+        </a:xfrm>
+      </p:grpSpPr>
+      <p:sp>
+        <p:nvSpPr>
+          <p:cNvPr id="2" name="Title 1"/>
+          <p:cNvSpPr>
+            <a:spLocks noGrp="1"/>
+          </p:cNvSpPr>
+          <p:nvPr>
+            <p:ph type="title"/>
+          </p:nvPr>
+        </p:nvSpPr>
+        <p:spPr/>
+        <p:txBody>
+          <a:bodyPr/>
+          <a:lstStyle/>
+          <a:p>
+            <a:r>
+              <a:rPr lang="en-US" dirty="0"/>
+              <a:t>The course</a:t>
+            </a:r>
+          </a:p>
+        </p:txBody>
+      </p:sp>
+      <p:pic>
+        <p:nvPicPr>
+          <p:cNvPr id="6" name="Picture 9" descr="Picture 2">
+            <a:extLst>
+              <a:ext uri="{FF2B5EF4-FFF2-40B4-BE49-F238E27FC236}">
+                <a16:creationId xmlns:a16="http://schemas.microsoft.com/office/drawing/2014/main" id="{A5895E3A-132B-4392-B846-BAB3DBF1D541}"/>
+              </a:ext>
+            </a:extLst>
+          </p:cNvPr>
+          <p:cNvPicPr>
+            <a:picLocks noChangeAspect="1" noChangeArrowheads="1"/>
+          </p:cNvPicPr>
+          <p:nvPr/>
+        </p:nvPicPr>
+        <p:blipFill>
+          <a:blip r:embed="rId2">
+            <a:extLst>
+              <a:ext uri="{28A0092B-C50C-407E-A947-70E740481C1C}">
+                <a14:useLocalDpi xmlns:a14="http://schemas.microsoft.com/office/drawing/2010/main" val="0"/>
+              </a:ext>
+            </a:extLst>
+          </a:blip>
+          <a:srcRect/>
+          <a:stretch>
+            <a:fillRect/>
+          </a:stretch>
+        </p:blipFill>
+        <p:spPr bwMode="auto">
+          <a:xfrm>
+            <a:off x="3270250" y="1668260"/>
+            <a:ext cx="6794500" cy="4940300"/>
+          </a:xfrm>
+          <a:prstGeom prst="rect">
+            <a:avLst/>
+          </a:prstGeom>
+          <a:noFill/>
+          <a:ln>
+            <a:noFill/>
+          </a:ln>
+          <a:extLst>
+            <a:ext uri="{909E8E84-426E-40DD-AFC4-6F175D3DCCD1}">
+              <a14:hiddenFill xmlns:a14="http://schemas.microsoft.com/office/drawing/2010/main">
+                <a:solidFill>
+                  <a:srgbClr val="FFFFFF"/>
+                </a:solidFill>
+              </a14:hiddenFill>
+            </a:ext>
+            <a:ext uri="{91240B29-F687-4F45-9708-019B960494DF}">
+              <a14:hiddenLine xmlns:a14="http://schemas.microsoft.com/office/drawing/2010/main" w="9525">
+                <a:solidFill>
+                  <a:srgbClr val="000000"/>
+                </a:solidFill>
+                <a:miter lim="800000"/>
+                <a:headEnd/>
+                <a:tailEnd/>
+              </a14:hiddenLine>
+            </a:ext>
+          </a:extLst>
+        </p:spPr>
+      </p:pic>
+    </p:spTree>
+    <p:extLst>
+      <p:ext uri="{BB962C8B-B14F-4D97-AF65-F5344CB8AC3E}">
+        <p14:creationId xmlns:p14="http://schemas.microsoft.com/office/powerpoint/2010/main" val="3630404179"/>
+      </p:ext>
+    </p:extLst>
+  </p:cSld>
+  <p:clrMapOvr>
+    <a:masterClrMapping/>
+  </p:clrMapOvr>
+  <mc:AlternateContent xmlns:mc="http://schemas.openxmlformats.org/markup-compatibility/2006" xmlns:p14="http://schemas.microsoft.com/office/powerpoint/2010/main">
+    <mc:Choice Requires="p14">
+      <p:transition spd="med" p14:dur="700">
+        <p:fade/>
+      </p:transition>
+    </mc:Choice>
+    <mc:Fallback xmlns="">
+      <p:transition spd="med">
+        <p:fade/>
+      </p:transition>
+    </mc:Fallback>
+  </mc:AlternateContent>
+</p:sld>
+</file>
+
+<file path=ppt/slides/slide5.xml><?xml version="1.0" encoding="utf-8"?>
+<p:sld xmlns:a="http://schemas.openxmlformats.org/drawingml/2006/main" xmlns:r="http://schemas.openxmlformats.org/officeDocument/2006/relationships" xmlns:p="http://schemas.openxmlformats.org/presentationml/2006/main">
+  <p:cSld>
+    <p:spTree>
+      <p:nvGrpSpPr>
+        <p:cNvPr id="1" name=""/>
+        <p:cNvGrpSpPr/>
+        <p:nvPr/>
+      </p:nvGrpSpPr>
+      <p:grpSpPr>
+        <a:xfrm>
+          <a:off x="0" y="0"/>
+          <a:ext cx="0" cy="0"/>
+          <a:chOff x="0" y="0"/>
+          <a:chExt cx="0" cy="0"/>
+        </a:xfrm>
+      </p:grpSpPr>
+      <p:sp>
+        <p:nvSpPr>
+          <p:cNvPr id="2" name="Title 1"/>
+          <p:cNvSpPr>
+            <a:spLocks noGrp="1"/>
+          </p:cNvSpPr>
+          <p:nvPr>
+            <p:ph type="title"/>
+          </p:nvPr>
+        </p:nvSpPr>
+        <p:spPr/>
+        <p:txBody>
+          <a:bodyPr/>
+          <a:lstStyle/>
+          <a:p>
+            <a:r>
+              <a:rPr lang="en-US" dirty="0"/>
+              <a:t>materials</a:t>
+            </a:r>
+          </a:p>
+        </p:txBody>
+      </p:sp>
+      <p:sp>
+        <p:nvSpPr>
+          <p:cNvPr id="3" name="Content Placeholder 2"/>
+          <p:cNvSpPr>
+            <a:spLocks noGrp="1"/>
+          </p:cNvSpPr>
+          <p:nvPr>
+            <p:ph idx="1"/>
+          </p:nvPr>
+        </p:nvSpPr>
+        <p:spPr/>
+        <p:txBody>
+          <a:bodyPr/>
+          <a:lstStyle/>
+          <a:p>
+            <a:pPr>
+              <a:spcBef>
+                <a:spcPts val="1200"/>
+              </a:spcBef>
+              <a:buFont typeface="Arial" panose="020B0604020202020204" pitchFamily="34" charset="0"/>
+              <a:buChar char="•"/>
+            </a:pPr>
+            <a:r>
+              <a:rPr lang="en-US" altLang="en-US" sz="2600" dirty="0">
+                <a:latin typeface="Arial" panose="020B0604020202020204" pitchFamily="34" charset="0"/>
+                <a:cs typeface="Arial" panose="020B0604020202020204" pitchFamily="34" charset="0"/>
+              </a:rPr>
+              <a:t>You must construct a vehicle to travel from point A to point B under its own power using only the following materials:</a:t>
+            </a:r>
+          </a:p>
+          <a:p>
+            <a:pPr marL="800100" lvl="1" indent="-342900">
+              <a:buFont typeface="Arial" panose="020B0604020202020204" pitchFamily="34" charset="0"/>
+              <a:buChar char="•"/>
+            </a:pPr>
+            <a:r>
+              <a:rPr lang="en-US" altLang="en-US" sz="2200" dirty="0">
+                <a:latin typeface="Arial" panose="020B0604020202020204" pitchFamily="34" charset="0"/>
+                <a:cs typeface="Arial" panose="020B0604020202020204" pitchFamily="34" charset="0"/>
+              </a:rPr>
+              <a:t>12” of Masking tape</a:t>
+            </a:r>
+          </a:p>
+          <a:p>
+            <a:pPr marL="800100" lvl="1" indent="-342900">
+              <a:buFont typeface="Arial" panose="020B0604020202020204" pitchFamily="34" charset="0"/>
+              <a:buChar char="•"/>
+            </a:pPr>
+            <a:r>
+              <a:rPr lang="en-US" altLang="en-US" sz="2200" dirty="0">
+                <a:latin typeface="Arial" panose="020B0604020202020204" pitchFamily="34" charset="0"/>
+                <a:cs typeface="Arial" panose="020B0604020202020204" pitchFamily="34" charset="0"/>
+              </a:rPr>
+              <a:t>1 Popsicle Stick</a:t>
+            </a:r>
+          </a:p>
+          <a:p>
+            <a:pPr marL="800100" lvl="1" indent="-342900">
+              <a:buFont typeface="Arial" panose="020B0604020202020204" pitchFamily="34" charset="0"/>
+              <a:buChar char="•"/>
+            </a:pPr>
+            <a:r>
+              <a:rPr lang="en-US" altLang="en-US" sz="2200" dirty="0">
+                <a:latin typeface="Arial" panose="020B0604020202020204" pitchFamily="34" charset="0"/>
+                <a:cs typeface="Arial" panose="020B0604020202020204" pitchFamily="34" charset="0"/>
+              </a:rPr>
+              <a:t>1 Balloon</a:t>
+            </a:r>
+          </a:p>
+          <a:p>
+            <a:pPr marL="800100" lvl="1" indent="-342900">
+              <a:buFont typeface="Arial" panose="020B0604020202020204" pitchFamily="34" charset="0"/>
+              <a:buChar char="•"/>
+            </a:pPr>
+            <a:r>
+              <a:rPr lang="en-US" altLang="en-US" sz="2200" dirty="0">
+                <a:latin typeface="Arial" panose="020B0604020202020204" pitchFamily="34" charset="0"/>
+                <a:cs typeface="Arial" panose="020B0604020202020204" pitchFamily="34" charset="0"/>
+              </a:rPr>
+              <a:t>2 paper clips</a:t>
+            </a:r>
+          </a:p>
+          <a:p>
+            <a:pPr marL="800100" lvl="1" indent="-342900">
+              <a:buFont typeface="Arial" panose="020B0604020202020204" pitchFamily="34" charset="0"/>
+              <a:buChar char="•"/>
+            </a:pPr>
+            <a:r>
+              <a:rPr lang="en-US" altLang="en-US" sz="2200" dirty="0">
+                <a:latin typeface="Arial" panose="020B0604020202020204" pitchFamily="34" charset="0"/>
+                <a:cs typeface="Arial" panose="020B0604020202020204" pitchFamily="34" charset="0"/>
+              </a:rPr>
+              <a:t>2 rubber bands</a:t>
+            </a:r>
+          </a:p>
+          <a:p>
+            <a:pPr marL="800100" lvl="1" indent="-342900">
+              <a:buFont typeface="Arial" panose="020B0604020202020204" pitchFamily="34" charset="0"/>
+              <a:buChar char="•"/>
+            </a:pPr>
+            <a:r>
+              <a:rPr lang="en-US" altLang="en-US" sz="2200" dirty="0">
+                <a:latin typeface="Arial" panose="020B0604020202020204" pitchFamily="34" charset="0"/>
+                <a:cs typeface="Arial" panose="020B0604020202020204" pitchFamily="34" charset="0"/>
+              </a:rPr>
+              <a:t>1 Clothespin for a passenger</a:t>
+            </a:r>
+          </a:p>
+        </p:txBody>
+      </p:sp>
+    </p:spTree>
+    <p:extLst>
+      <p:ext uri="{BB962C8B-B14F-4D97-AF65-F5344CB8AC3E}">
+        <p14:creationId xmlns:p14="http://schemas.microsoft.com/office/powerpoint/2010/main" val="526088194"/>
+      </p:ext>
+    </p:extLst>
+  </p:cSld>
+  <p:clrMapOvr>
+    <a:masterClrMapping/>
+  </p:clrMapOvr>
+  <mc:AlternateContent xmlns:mc="http://schemas.openxmlformats.org/markup-compatibility/2006" xmlns:p14="http://schemas.microsoft.com/office/powerpoint/2010/main">
+    <mc:Choice Requires="p14">
+      <p:transition spd="med" p14:dur="700">
+        <p:fade/>
+      </p:transition>
+    </mc:Choice>
+    <mc:Fallback xmlns="">
+      <p:transition spd="med">
+        <p:fade/>
+      </p:transition>
+    </mc:Fallback>
+  </mc:AlternateContent>
+</p:sld>
+</file>
+
+<file path=ppt/slides/slide6.xml><?xml version="1.0" encoding="utf-8"?>
+<p:sld xmlns:a="http://schemas.openxmlformats.org/drawingml/2006/main" xmlns:r="http://schemas.openxmlformats.org/officeDocument/2006/relationships" xmlns:p="http://schemas.openxmlformats.org/presentationml/2006/main">
+  <p:cSld>
+    <p:spTree>
+      <p:nvGrpSpPr>
+        <p:cNvPr id="1" name=""/>
+        <p:cNvGrpSpPr/>
+        <p:nvPr/>
+      </p:nvGrpSpPr>
+      <p:grpSpPr>
+        <a:xfrm>
+          <a:off x="0" y="0"/>
+          <a:ext cx="0" cy="0"/>
+          <a:chOff x="0" y="0"/>
+          <a:chExt cx="0" cy="0"/>
+        </a:xfrm>
+      </p:grpSpPr>
+      <p:sp>
+        <p:nvSpPr>
+          <p:cNvPr id="2" name="Title 1"/>
+          <p:cNvSpPr>
+            <a:spLocks noGrp="1"/>
+          </p:cNvSpPr>
+          <p:nvPr>
+            <p:ph type="title"/>
+          </p:nvPr>
+        </p:nvSpPr>
+        <p:spPr/>
+        <p:txBody>
+          <a:bodyPr/>
+          <a:lstStyle/>
+          <a:p>
+            <a:r>
+              <a:rPr lang="en-US" dirty="0"/>
               <a:t>Title and content layout with chart</a:t>
             </a:r>
           </a:p>
@@ -9983,7 +10722,7 @@
 </p:sld>
 </file>
 
-<file path=ppt/slides/slide4.xml><?xml version="1.0" encoding="utf-8"?>
+<file path=ppt/slides/slide7.xml><?xml version="1.0" encoding="utf-8"?>
 <p:sld xmlns:a="http://schemas.openxmlformats.org/drawingml/2006/main" xmlns:r="http://schemas.openxmlformats.org/officeDocument/2006/relationships" xmlns:p="http://schemas.openxmlformats.org/presentationml/2006/main">
   <p:cSld>
     <p:spTree>
@@ -10329,7 +11068,7 @@
 </p:sld>
 </file>
 
-<file path=ppt/slides/slide5.xml><?xml version="1.0" encoding="utf-8"?>
+<file path=ppt/slides/slide8.xml><?xml version="1.0" encoding="utf-8"?>
 <p:sld xmlns:a="http://schemas.openxmlformats.org/drawingml/2006/main" xmlns:r="http://schemas.openxmlformats.org/officeDocument/2006/relationships" xmlns:p="http://schemas.openxmlformats.org/presentationml/2006/main">
   <p:cSld>
     <p:spTree>
@@ -10452,293 +11191,6 @@
 </p:sld>
 </file>
 
-<file path=ppt/slides/slide6.xml><?xml version="1.0" encoding="utf-8"?>
-<p:sld xmlns:a="http://schemas.openxmlformats.org/drawingml/2006/main" xmlns:r="http://schemas.openxmlformats.org/officeDocument/2006/relationships" xmlns:p="http://schemas.openxmlformats.org/presentationml/2006/main">
-  <p:cSld>
-    <p:spTree>
-      <p:nvGrpSpPr>
-        <p:cNvPr id="1" name=""/>
-        <p:cNvGrpSpPr/>
-        <p:nvPr/>
-      </p:nvGrpSpPr>
-      <p:grpSpPr>
-        <a:xfrm>
-          <a:off x="0" y="0"/>
-          <a:ext cx="0" cy="0"/>
-          <a:chOff x="0" y="0"/>
-          <a:chExt cx="0" cy="0"/>
-        </a:xfrm>
-      </p:grpSpPr>
-      <p:sp>
-        <p:nvSpPr>
-          <p:cNvPr id="2" name="Title 1"/>
-          <p:cNvSpPr>
-            <a:spLocks noGrp="1"/>
-          </p:cNvSpPr>
-          <p:nvPr>
-            <p:ph type="title"/>
-          </p:nvPr>
-        </p:nvSpPr>
-        <p:spPr/>
-        <p:txBody>
-          <a:bodyPr/>
-          <a:lstStyle/>
-          <a:p>
-            <a:r>
-              <a:rPr lang="en-US" dirty="0"/>
-              <a:t>Add a Slide Title - 1</a:t>
-            </a:r>
-          </a:p>
-        </p:txBody>
-      </p:sp>
-      <p:sp>
-        <p:nvSpPr>
-          <p:cNvPr id="3" name="Text Placeholder 2"/>
-          <p:cNvSpPr>
-            <a:spLocks noGrp="1"/>
-          </p:cNvSpPr>
-          <p:nvPr>
-            <p:ph type="body" idx="1"/>
-          </p:nvPr>
-        </p:nvSpPr>
-        <p:spPr/>
-        <p:txBody>
-          <a:bodyPr/>
-          <a:lstStyle/>
-          <a:p>
-            <a:endParaRPr lang="en-US" dirty="0"/>
-          </a:p>
-        </p:txBody>
-      </p:sp>
-    </p:spTree>
-    <p:extLst>
-      <p:ext uri="{BB962C8B-B14F-4D97-AF65-F5344CB8AC3E}">
-        <p14:creationId xmlns:p14="http://schemas.microsoft.com/office/powerpoint/2010/main" val="468619527"/>
-      </p:ext>
-    </p:extLst>
-  </p:cSld>
-  <p:clrMapOvr>
-    <a:masterClrMapping/>
-  </p:clrMapOvr>
-  <mc:AlternateContent xmlns:mc="http://schemas.openxmlformats.org/markup-compatibility/2006" xmlns:p14="http://schemas.microsoft.com/office/powerpoint/2010/main">
-    <mc:Choice Requires="p14">
-      <p:transition spd="med" p14:dur="700">
-        <p:fade/>
-      </p:transition>
-    </mc:Choice>
-    <mc:Fallback xmlns="">
-      <p:transition spd="med">
-        <p:fade/>
-      </p:transition>
-    </mc:Fallback>
-  </mc:AlternateContent>
-</p:sld>
-</file>
-
-<file path=ppt/slides/slide7.xml><?xml version="1.0" encoding="utf-8"?>
-<p:sld xmlns:a="http://schemas.openxmlformats.org/drawingml/2006/main" xmlns:r="http://schemas.openxmlformats.org/officeDocument/2006/relationships" xmlns:p="http://schemas.openxmlformats.org/presentationml/2006/main">
-  <p:cSld>
-    <p:spTree>
-      <p:nvGrpSpPr>
-        <p:cNvPr id="1" name=""/>
-        <p:cNvGrpSpPr/>
-        <p:nvPr/>
-      </p:nvGrpSpPr>
-      <p:grpSpPr>
-        <a:xfrm>
-          <a:off x="0" y="0"/>
-          <a:ext cx="0" cy="0"/>
-          <a:chOff x="0" y="0"/>
-          <a:chExt cx="0" cy="0"/>
-        </a:xfrm>
-      </p:grpSpPr>
-      <p:sp>
-        <p:nvSpPr>
-          <p:cNvPr id="2" name="Title 1"/>
-          <p:cNvSpPr>
-            <a:spLocks noGrp="1"/>
-          </p:cNvSpPr>
-          <p:nvPr>
-            <p:ph type="title"/>
-          </p:nvPr>
-        </p:nvSpPr>
-        <p:spPr/>
-        <p:txBody>
-          <a:bodyPr/>
-          <a:lstStyle/>
-          <a:p>
-            <a:r>
-              <a:rPr lang="en-US" dirty="0"/>
-              <a:t>Add a Slide Title - 2</a:t>
-            </a:r>
-          </a:p>
-        </p:txBody>
-      </p:sp>
-      <p:sp>
-        <p:nvSpPr>
-          <p:cNvPr id="3" name="Text Placeholder 2"/>
-          <p:cNvSpPr>
-            <a:spLocks noGrp="1"/>
-          </p:cNvSpPr>
-          <p:nvPr>
-            <p:ph type="body" idx="1"/>
-          </p:nvPr>
-        </p:nvSpPr>
-        <p:spPr/>
-        <p:txBody>
-          <a:bodyPr/>
-          <a:lstStyle/>
-          <a:p>
-            <a:endParaRPr lang="en-US" dirty="0"/>
-          </a:p>
-        </p:txBody>
-      </p:sp>
-      <p:sp>
-        <p:nvSpPr>
-          <p:cNvPr id="4" name="Content Placeholder 3"/>
-          <p:cNvSpPr>
-            <a:spLocks noGrp="1"/>
-          </p:cNvSpPr>
-          <p:nvPr>
-            <p:ph sz="half" idx="2"/>
-          </p:nvPr>
-        </p:nvSpPr>
-        <p:spPr/>
-        <p:txBody>
-          <a:bodyPr/>
-          <a:lstStyle/>
-          <a:p>
-            <a:endParaRPr lang="en-US" dirty="0"/>
-          </a:p>
-        </p:txBody>
-      </p:sp>
-      <p:sp>
-        <p:nvSpPr>
-          <p:cNvPr id="5" name="Text Placeholder 4"/>
-          <p:cNvSpPr>
-            <a:spLocks noGrp="1"/>
-          </p:cNvSpPr>
-          <p:nvPr>
-            <p:ph type="body" sz="quarter" idx="3"/>
-          </p:nvPr>
-        </p:nvSpPr>
-        <p:spPr/>
-        <p:txBody>
-          <a:bodyPr/>
-          <a:lstStyle/>
-          <a:p>
-            <a:endParaRPr lang="en-US" dirty="0"/>
-          </a:p>
-        </p:txBody>
-      </p:sp>
-      <p:sp>
-        <p:nvSpPr>
-          <p:cNvPr id="6" name="Content Placeholder 5"/>
-          <p:cNvSpPr>
-            <a:spLocks noGrp="1"/>
-          </p:cNvSpPr>
-          <p:nvPr>
-            <p:ph sz="quarter" idx="4"/>
-          </p:nvPr>
-        </p:nvSpPr>
-        <p:spPr/>
-        <p:txBody>
-          <a:bodyPr/>
-          <a:lstStyle/>
-          <a:p>
-            <a:endParaRPr lang="en-US" dirty="0"/>
-          </a:p>
-        </p:txBody>
-      </p:sp>
-    </p:spTree>
-    <p:extLst>
-      <p:ext uri="{BB962C8B-B14F-4D97-AF65-F5344CB8AC3E}">
-        <p14:creationId xmlns:p14="http://schemas.microsoft.com/office/powerpoint/2010/main" val="1397893279"/>
-      </p:ext>
-    </p:extLst>
-  </p:cSld>
-  <p:clrMapOvr>
-    <a:masterClrMapping/>
-  </p:clrMapOvr>
-  <mc:AlternateContent xmlns:mc="http://schemas.openxmlformats.org/markup-compatibility/2006" xmlns:p14="http://schemas.microsoft.com/office/powerpoint/2010/main">
-    <mc:Choice Requires="p14">
-      <p:transition spd="med" p14:dur="700">
-        <p:fade/>
-      </p:transition>
-    </mc:Choice>
-    <mc:Fallback xmlns="">
-      <p:transition spd="med">
-        <p:fade/>
-      </p:transition>
-    </mc:Fallback>
-  </mc:AlternateContent>
-</p:sld>
-</file>
-
-<file path=ppt/slides/slide8.xml><?xml version="1.0" encoding="utf-8"?>
-<p:sld xmlns:a="http://schemas.openxmlformats.org/drawingml/2006/main" xmlns:r="http://schemas.openxmlformats.org/officeDocument/2006/relationships" xmlns:p="http://schemas.openxmlformats.org/presentationml/2006/main">
-  <p:cSld>
-    <p:spTree>
-      <p:nvGrpSpPr>
-        <p:cNvPr id="1" name=""/>
-        <p:cNvGrpSpPr/>
-        <p:nvPr/>
-      </p:nvGrpSpPr>
-      <p:grpSpPr>
-        <a:xfrm>
-          <a:off x="0" y="0"/>
-          <a:ext cx="0" cy="0"/>
-          <a:chOff x="0" y="0"/>
-          <a:chExt cx="0" cy="0"/>
-        </a:xfrm>
-      </p:grpSpPr>
-      <p:sp>
-        <p:nvSpPr>
-          <p:cNvPr id="2" name="Title 1"/>
-          <p:cNvSpPr>
-            <a:spLocks noGrp="1"/>
-          </p:cNvSpPr>
-          <p:nvPr>
-            <p:ph type="title"/>
-          </p:nvPr>
-        </p:nvSpPr>
-        <p:spPr/>
-        <p:txBody>
-          <a:bodyPr/>
-          <a:lstStyle/>
-          <a:p>
-            <a:r>
-              <a:rPr lang="en-US" dirty="0"/>
-              <a:t>Add a Slide Title - 3</a:t>
-            </a:r>
-          </a:p>
-        </p:txBody>
-      </p:sp>
-    </p:spTree>
-    <p:extLst>
-      <p:ext uri="{BB962C8B-B14F-4D97-AF65-F5344CB8AC3E}">
-        <p14:creationId xmlns:p14="http://schemas.microsoft.com/office/powerpoint/2010/main" val="2132301138"/>
-      </p:ext>
-    </p:extLst>
-  </p:cSld>
-  <p:clrMapOvr>
-    <a:masterClrMapping/>
-  </p:clrMapOvr>
-  <mc:AlternateContent xmlns:mc="http://schemas.openxmlformats.org/markup-compatibility/2006" xmlns:p14="http://schemas.microsoft.com/office/powerpoint/2010/main">
-    <mc:Choice Requires="p14">
-      <p:transition spd="med" p14:dur="700">
-        <p:fade/>
-      </p:transition>
-    </mc:Choice>
-    <mc:Fallback xmlns="">
-      <p:transition spd="med">
-        <p:fade/>
-      </p:transition>
-    </mc:Fallback>
-  </mc:AlternateContent>
-</p:sld>
-</file>
-
 <file path=ppt/slides/slide9.xml><?xml version="1.0" encoding="utf-8"?>
 <p:sld xmlns:a="http://schemas.openxmlformats.org/drawingml/2006/main" xmlns:r="http://schemas.openxmlformats.org/officeDocument/2006/relationships" xmlns:p="http://schemas.openxmlformats.org/presentationml/2006/main">
   <p:cSld>
@@ -10773,19 +11225,19 @@
           <a:p>
             <a:r>
               <a:rPr lang="en-US" dirty="0"/>
-              <a:t>Add a Slide Title - 4</a:t>
+              <a:t>Add a Slide Title - 1</a:t>
             </a:r>
           </a:p>
         </p:txBody>
       </p:sp>
       <p:sp>
         <p:nvSpPr>
-          <p:cNvPr id="3" name="Content Placeholder 2"/>
+          <p:cNvPr id="3" name="Text Placeholder 2"/>
           <p:cNvSpPr>
             <a:spLocks noGrp="1"/>
           </p:cNvSpPr>
           <p:nvPr>
-            <p:ph idx="1"/>
+            <p:ph type="body" idx="1"/>
           </p:nvPr>
         </p:nvSpPr>
         <p:spPr/>
@@ -10797,29 +11249,10 @@
           </a:p>
         </p:txBody>
       </p:sp>
-      <p:sp>
-        <p:nvSpPr>
-          <p:cNvPr id="4" name="Text Placeholder 3"/>
-          <p:cNvSpPr>
-            <a:spLocks noGrp="1"/>
-          </p:cNvSpPr>
-          <p:nvPr>
-            <p:ph type="body" sz="half" idx="2"/>
-          </p:nvPr>
-        </p:nvSpPr>
-        <p:spPr/>
-        <p:txBody>
-          <a:bodyPr/>
-          <a:lstStyle/>
-          <a:p>
-            <a:endParaRPr lang="en-US" dirty="0"/>
-          </a:p>
-        </p:txBody>
-      </p:sp>
     </p:spTree>
     <p:extLst>
       <p:ext uri="{BB962C8B-B14F-4D97-AF65-F5344CB8AC3E}">
-        <p14:creationId xmlns:p14="http://schemas.microsoft.com/office/powerpoint/2010/main" val="1718594860"/>
+        <p14:creationId xmlns:p14="http://schemas.microsoft.com/office/powerpoint/2010/main" val="468619527"/>
       </p:ext>
     </p:extLst>
   </p:cSld>

</xml_diff>